<commit_message>
Update Query Millions of WGS Variants in Minutes with Azure Synapse.pptx
</commit_message>
<xml_diff>
--- a/Query Millions of WGS Variants in Minutes with Azure Synapse.pptx
+++ b/Query Millions of WGS Variants in Minutes with Azure Synapse.pptx
@@ -10,8 +10,8 @@
   </p:notesMasterIdLst>
   <p:sldIdLst>
     <p:sldId id="257" r:id="rId6"/>
-    <p:sldId id="258" r:id="rId7"/>
-    <p:sldId id="261" r:id="rId8"/>
+    <p:sldId id="261" r:id="rId7"/>
+    <p:sldId id="258" r:id="rId8"/>
     <p:sldId id="259" r:id="rId9"/>
     <p:sldId id="260" r:id="rId10"/>
   </p:sldIdLst>
@@ -931,7 +931,7 @@
               <a:latin typeface="Segoe UI" panose="020B0502040204020203" pitchFamily="34" charset="0"/>
               <a:cs typeface="Segoe UI" panose="020B0502040204020203" pitchFamily="34" charset="0"/>
             </a:rPr>
-            <a:t>1000 Genomes</a:t>
+            <a:t>1000 Genomes Project</a:t>
           </a:r>
         </a:p>
       </dgm:t>
@@ -1428,8 +1428,8 @@
       </dsp:nvSpPr>
       <dsp:spPr>
         <a:xfrm>
-          <a:off x="872" y="1820"/>
-          <a:ext cx="7598741" cy="1598279"/>
+          <a:off x="1067" y="3440"/>
+          <a:ext cx="9302698" cy="1578486"/>
         </a:xfrm>
         <a:prstGeom prst="rect">
           <a:avLst/>
@@ -1493,13 +1493,13 @@
               <a:latin typeface="Segoe UI" panose="020B0502040204020203" pitchFamily="34" charset="0"/>
               <a:cs typeface="Segoe UI" panose="020B0502040204020203" pitchFamily="34" charset="0"/>
             </a:rPr>
-            <a:t>1000 Genomes</a:t>
+            <a:t>1000 Genomes Project</a:t>
           </a:r>
         </a:p>
       </dsp:txBody>
       <dsp:txXfrm>
-        <a:off x="872" y="1820"/>
-        <a:ext cx="7598741" cy="1598279"/>
+        <a:off x="1067" y="3440"/>
+        <a:ext cx="9302698" cy="1578486"/>
       </dsp:txXfrm>
     </dsp:sp>
     <dsp:sp modelId="{2F14CD38-6701-49FF-841C-1BC86CAC943C}">
@@ -1509,8 +1509,8 @@
       </dsp:nvSpPr>
       <dsp:spPr>
         <a:xfrm>
-          <a:off x="872" y="1734356"/>
-          <a:ext cx="4963733" cy="1598279"/>
+          <a:off x="1067" y="1744252"/>
+          <a:ext cx="6076810" cy="1578486"/>
         </a:xfrm>
         <a:prstGeom prst="rect">
           <a:avLst/>
@@ -1552,12 +1552,12 @@
         </a:fontRef>
       </dsp:style>
       <dsp:txBody>
-        <a:bodyPr spcFirstLastPara="0" vert="horz" wrap="square" lIns="160020" tIns="160020" rIns="160020" bIns="160020" numCol="1" spcCol="1270" anchor="ctr" anchorCtr="0">
+        <a:bodyPr spcFirstLastPara="0" vert="horz" wrap="square" lIns="179070" tIns="179070" rIns="179070" bIns="179070" numCol="1" spcCol="1270" anchor="ctr" anchorCtr="0">
           <a:noAutofit/>
         </a:bodyPr>
         <a:lstStyle/>
         <a:p>
-          <a:pPr marL="0" lvl="0" indent="0" algn="ctr" defTabSz="1866900">
+          <a:pPr marL="0" lvl="0" indent="0" algn="ctr" defTabSz="2089150">
             <a:lnSpc>
               <a:spcPct val="90000"/>
             </a:lnSpc>
@@ -1570,7 +1570,7 @@
             <a:buNone/>
           </a:pPr>
           <a:r>
-            <a:rPr lang="en-US" sz="4200" b="1" kern="1200" dirty="0">
+            <a:rPr lang="en-US" sz="4700" b="1" kern="1200" dirty="0">
               <a:latin typeface="Segoe UI" panose="020B0502040204020203" pitchFamily="34" charset="0"/>
               <a:cs typeface="Segoe UI" panose="020B0502040204020203" pitchFamily="34" charset="0"/>
             </a:rPr>
@@ -1579,8 +1579,8 @@
         </a:p>
       </dsp:txBody>
       <dsp:txXfrm>
-        <a:off x="872" y="1734356"/>
-        <a:ext cx="4963733" cy="1598279"/>
+        <a:off x="1067" y="1744252"/>
+        <a:ext cx="6076810" cy="1578486"/>
       </dsp:txXfrm>
     </dsp:sp>
     <dsp:sp modelId="{AE7873C4-9217-42FD-9F32-818BFB9462A8}">
@@ -1590,8 +1590,8 @@
       </dsp:nvSpPr>
       <dsp:spPr>
         <a:xfrm>
-          <a:off x="872" y="3466891"/>
-          <a:ext cx="2430819" cy="1598279"/>
+          <a:off x="1067" y="3485065"/>
+          <a:ext cx="2975911" cy="1578486"/>
         </a:xfrm>
         <a:prstGeom prst="rect">
           <a:avLst/>
@@ -1676,8 +1676,8 @@
         </a:p>
       </dsp:txBody>
       <dsp:txXfrm>
-        <a:off x="872" y="3466891"/>
-        <a:ext cx="2430819" cy="1598279"/>
+        <a:off x="1067" y="3485065"/>
+        <a:ext cx="2975911" cy="1578486"/>
       </dsp:txXfrm>
     </dsp:sp>
     <dsp:sp modelId="{33BE92E6-9293-411F-98C7-1B3EACBEB49F}">
@@ -1687,8 +1687,8 @@
       </dsp:nvSpPr>
       <dsp:spPr>
         <a:xfrm>
-          <a:off x="2533786" y="3466891"/>
-          <a:ext cx="2430819" cy="1598279"/>
+          <a:off x="3101967" y="3485065"/>
+          <a:ext cx="2975911" cy="1578486"/>
         </a:xfrm>
         <a:prstGeom prst="rect">
           <a:avLst/>
@@ -1752,8 +1752,8 @@
         </a:p>
       </dsp:txBody>
       <dsp:txXfrm>
-        <a:off x="2533786" y="3466891"/>
-        <a:ext cx="2430819" cy="1598279"/>
+        <a:off x="3101967" y="3485065"/>
+        <a:ext cx="2975911" cy="1578486"/>
       </dsp:txXfrm>
     </dsp:sp>
     <dsp:sp modelId="{B8AE5867-B8D7-412B-B959-0B47D66EB627}">
@@ -1763,8 +1763,8 @@
       </dsp:nvSpPr>
       <dsp:spPr>
         <a:xfrm>
-          <a:off x="5168794" y="1734356"/>
-          <a:ext cx="2430819" cy="1598279"/>
+          <a:off x="6327855" y="1744252"/>
+          <a:ext cx="2975911" cy="1578486"/>
         </a:xfrm>
         <a:prstGeom prst="rect">
           <a:avLst/>
@@ -1832,8 +1832,8 @@
         </a:p>
       </dsp:txBody>
       <dsp:txXfrm>
-        <a:off x="5168794" y="1734356"/>
-        <a:ext cx="2430819" cy="1598279"/>
+        <a:off x="6327855" y="1744252"/>
+        <a:ext cx="2975911" cy="1578486"/>
       </dsp:txXfrm>
     </dsp:sp>
     <dsp:sp modelId="{A5299E66-8E01-4673-ABC2-9E3B8CB88A8B}">
@@ -1843,8 +1843,8 @@
       </dsp:nvSpPr>
       <dsp:spPr>
         <a:xfrm>
-          <a:off x="5168794" y="3466891"/>
-          <a:ext cx="2430819" cy="1598279"/>
+          <a:off x="6327855" y="3485065"/>
+          <a:ext cx="2975911" cy="1578486"/>
         </a:xfrm>
         <a:prstGeom prst="rect">
           <a:avLst/>
@@ -1908,8 +1908,8 @@
         </a:p>
       </dsp:txBody>
       <dsp:txXfrm>
-        <a:off x="5168794" y="3466891"/>
-        <a:ext cx="2430819" cy="1598279"/>
+        <a:off x="6327855" y="3485065"/>
+        <a:ext cx="2975911" cy="1578486"/>
       </dsp:txXfrm>
     </dsp:sp>
   </dsp:spTree>
@@ -19760,7 +19760,7 @@
           <p:cNvPr id="2" name="Title 1">
             <a:extLst>
               <a:ext uri="{FF2B5EF4-FFF2-40B4-BE49-F238E27FC236}">
-                <a16:creationId xmlns:a16="http://schemas.microsoft.com/office/drawing/2014/main" id="{2360F4C3-03C3-497C-8ED2-C06D8A18BB21}"/>
+                <a16:creationId xmlns:a16="http://schemas.microsoft.com/office/drawing/2014/main" id="{918583D6-B5AC-4CBA-9ADE-FA8BCFA78BC8}"/>
               </a:ext>
             </a:extLst>
           </p:cNvPr>
@@ -19778,43 +19778,194 @@
           <a:p>
             <a:r>
               <a:rPr lang="en-US" dirty="0"/>
-              <a:t>Quick Stats</a:t>
+              <a:t>What’s Azure Synapse?</a:t>
             </a:r>
           </a:p>
         </p:txBody>
       </p:sp>
-      <p:graphicFrame>
-        <p:nvGraphicFramePr>
-          <p:cNvPr id="13" name="Diagram 12">
+      <p:sp>
+        <p:nvSpPr>
+          <p:cNvPr id="3" name="Content Placeholder 2">
             <a:extLst>
               <a:ext uri="{FF2B5EF4-FFF2-40B4-BE49-F238E27FC236}">
-                <a16:creationId xmlns:a16="http://schemas.microsoft.com/office/drawing/2014/main" id="{787FB041-1B93-4807-92A2-F4783D98D53B}"/>
+                <a16:creationId xmlns:a16="http://schemas.microsoft.com/office/drawing/2014/main" id="{B4AB5789-DB02-45C6-A8ED-8C6F1B1DB8E7}"/>
               </a:ext>
             </a:extLst>
           </p:cNvPr>
-          <p:cNvGraphicFramePr/>
+          <p:cNvSpPr>
+            <a:spLocks noGrp="1"/>
+          </p:cNvSpPr>
           <p:nvPr>
-            <p:extLst>
-              <p:ext uri="{D42A27DB-BD31-4B8C-83A1-F6EECF244321}">
-                <p14:modId xmlns:p14="http://schemas.microsoft.com/office/powerpoint/2010/main" val="2969104075"/>
-              </p:ext>
-            </p:extLst>
+            <p:ph idx="1"/>
           </p:nvPr>
-        </p:nvGraphicFramePr>
-        <p:xfrm>
-          <a:off x="2289472" y="1515623"/>
-          <a:ext cx="7600486" cy="5066992"/>
-        </p:xfrm>
-        <a:graphic>
-          <a:graphicData uri="http://schemas.openxmlformats.org/drawingml/2006/diagram">
-            <dgm:relIds xmlns:dgm="http://schemas.openxmlformats.org/drawingml/2006/diagram" xmlns:r="http://schemas.openxmlformats.org/officeDocument/2006/relationships" r:dm="rId2" r:lo="rId3" r:qs="rId4" r:cs="rId5"/>
-          </a:graphicData>
-        </a:graphic>
-      </p:graphicFrame>
+        </p:nvSpPr>
+        <p:spPr>
+          <a:xfrm>
+            <a:off x="377073" y="1791798"/>
+            <a:ext cx="6297104" cy="4309749"/>
+          </a:xfrm>
+        </p:spPr>
+        <p:txBody>
+          <a:bodyPr/>
+          <a:lstStyle/>
+          <a:p>
+            <a:r>
+              <a:rPr lang="en-US" dirty="0"/>
+              <a:t>Scalable analytics platform that includes Azure SQL Data Warehouse, Data Lake exploration, Apache Spark, integration with Power BI, and more.</a:t>
+            </a:r>
+          </a:p>
+        </p:txBody>
+      </p:sp>
+      <p:sp>
+        <p:nvSpPr>
+          <p:cNvPr id="4" name="Text Placeholder 3">
+            <a:extLst>
+              <a:ext uri="{FF2B5EF4-FFF2-40B4-BE49-F238E27FC236}">
+                <a16:creationId xmlns:a16="http://schemas.microsoft.com/office/drawing/2014/main" id="{71D706D2-4641-4EB2-AE53-A80B3B3F8606}"/>
+              </a:ext>
+            </a:extLst>
+          </p:cNvPr>
+          <p:cNvSpPr>
+            <a:spLocks noGrp="1"/>
+          </p:cNvSpPr>
+          <p:nvPr>
+            <p:ph type="body" idx="13"/>
+          </p:nvPr>
+        </p:nvSpPr>
+        <p:spPr/>
+        <p:txBody>
+          <a:bodyPr/>
+          <a:lstStyle/>
+          <a:p>
+            <a:r>
+              <a:rPr lang="en-US" dirty="0"/>
+              <a:t>“Limitless analytics service with unmatched time to insight.”</a:t>
+            </a:r>
+          </a:p>
+        </p:txBody>
+      </p:sp>
+      <p:pic>
+        <p:nvPicPr>
+          <p:cNvPr id="7" name="Picture Placeholder 6">
+            <a:extLst>
+              <a:ext uri="{FF2B5EF4-FFF2-40B4-BE49-F238E27FC236}">
+                <a16:creationId xmlns:a16="http://schemas.microsoft.com/office/drawing/2014/main" id="{608067B8-87BF-4637-80BD-753441C95CBB}"/>
+              </a:ext>
+            </a:extLst>
+          </p:cNvPr>
+          <p:cNvPicPr>
+            <a:picLocks noGrp="1" noChangeAspect="1"/>
+          </p:cNvPicPr>
+          <p:nvPr>
+            <p:ph type="pic" sz="quarter" idx="14"/>
+          </p:nvPr>
+        </p:nvPicPr>
+        <p:blipFill rotWithShape="1">
+          <a:blip r:embed="rId2">
+            <a:extLst>
+              <a:ext uri="{96DAC541-7B7A-43D3-8B79-37D633B846F1}">
+                <asvg:svgBlip xmlns:asvg="http://schemas.microsoft.com/office/drawing/2016/SVG/main" r:embed="rId3"/>
+              </a:ext>
+            </a:extLst>
+          </a:blip>
+          <a:srcRect l="-11684" t="-9759" r="-11684" b="-9759"/>
+          <a:stretch/>
+        </p:blipFill>
+        <p:spPr>
+          <a:xfrm>
+            <a:off x="8024212" y="842455"/>
+            <a:ext cx="3616572" cy="3504976"/>
+          </a:xfrm>
+        </p:spPr>
+      </p:pic>
+      <p:pic>
+        <p:nvPicPr>
+          <p:cNvPr id="9" name="Picture 8">
+            <a:extLst>
+              <a:ext uri="{FF2B5EF4-FFF2-40B4-BE49-F238E27FC236}">
+                <a16:creationId xmlns:a16="http://schemas.microsoft.com/office/drawing/2014/main" id="{52A753E6-970F-4795-A885-158E0E684196}"/>
+              </a:ext>
+            </a:extLst>
+          </p:cNvPr>
+          <p:cNvPicPr>
+            <a:picLocks noChangeAspect="1"/>
+          </p:cNvPicPr>
+          <p:nvPr/>
+        </p:nvPicPr>
+        <p:blipFill>
+          <a:blip r:embed="rId4"/>
+          <a:stretch>
+            <a:fillRect/>
+          </a:stretch>
+        </p:blipFill>
+        <p:spPr>
+          <a:xfrm>
+            <a:off x="447041" y="2854664"/>
+            <a:ext cx="6454986" cy="2813457"/>
+          </a:xfrm>
+          <a:prstGeom prst="rect">
+            <a:avLst/>
+          </a:prstGeom>
+          <a:ln>
+            <a:solidFill>
+              <a:schemeClr val="accent1"/>
+            </a:solidFill>
+          </a:ln>
+          <a:effectLst>
+            <a:outerShdw blurRad="50800" dist="38100" dir="2700000" algn="tl" rotWithShape="0">
+              <a:prstClr val="black">
+                <a:alpha val="40000"/>
+              </a:prstClr>
+            </a:outerShdw>
+          </a:effectLst>
+        </p:spPr>
+      </p:pic>
+      <p:pic>
+        <p:nvPicPr>
+          <p:cNvPr id="11" name="Picture 10" descr="Chart&#10;&#10;Description automatically generated">
+            <a:extLst>
+              <a:ext uri="{FF2B5EF4-FFF2-40B4-BE49-F238E27FC236}">
+                <a16:creationId xmlns:a16="http://schemas.microsoft.com/office/drawing/2014/main" id="{A3C6C0E6-77F4-4AC8-B78C-8E85CA3BAE9D}"/>
+              </a:ext>
+            </a:extLst>
+          </p:cNvPr>
+          <p:cNvPicPr>
+            <a:picLocks noChangeAspect="1"/>
+          </p:cNvPicPr>
+          <p:nvPr/>
+        </p:nvPicPr>
+        <p:blipFill>
+          <a:blip r:embed="rId5"/>
+          <a:stretch>
+            <a:fillRect/>
+          </a:stretch>
+        </p:blipFill>
+        <p:spPr>
+          <a:xfrm>
+            <a:off x="3025105" y="4644106"/>
+            <a:ext cx="6725920" cy="2050264"/>
+          </a:xfrm>
+          <a:prstGeom prst="rect">
+            <a:avLst/>
+          </a:prstGeom>
+          <a:ln>
+            <a:solidFill>
+              <a:schemeClr val="accent1"/>
+            </a:solidFill>
+          </a:ln>
+          <a:effectLst>
+            <a:outerShdw blurRad="50800" dist="38100" dir="2700000" algn="tl" rotWithShape="0">
+              <a:prstClr val="black">
+                <a:alpha val="40000"/>
+              </a:prstClr>
+            </a:outerShdw>
+          </a:effectLst>
+        </p:spPr>
+      </p:pic>
     </p:spTree>
     <p:extLst>
       <p:ext uri="{BB962C8B-B14F-4D97-AF65-F5344CB8AC3E}">
-        <p14:creationId xmlns:p14="http://schemas.microsoft.com/office/powerpoint/2010/main" val="650675843"/>
+        <p14:creationId xmlns:p14="http://schemas.microsoft.com/office/powerpoint/2010/main" val="3475126820"/>
       </p:ext>
     </p:extLst>
   </p:cSld>
@@ -19846,7 +19997,7 @@
           <p:cNvPr id="2" name="Title 1">
             <a:extLst>
               <a:ext uri="{FF2B5EF4-FFF2-40B4-BE49-F238E27FC236}">
-                <a16:creationId xmlns:a16="http://schemas.microsoft.com/office/drawing/2014/main" id="{918583D6-B5AC-4CBA-9ADE-FA8BCFA78BC8}"/>
+                <a16:creationId xmlns:a16="http://schemas.microsoft.com/office/drawing/2014/main" id="{2360F4C3-03C3-497C-8ED2-C06D8A18BB21}"/>
               </a:ext>
             </a:extLst>
           </p:cNvPr>
@@ -19864,102 +20015,130 @@
           <a:p>
             <a:r>
               <a:rPr lang="en-US" dirty="0"/>
-              <a:t>What’s Azure Synapse?</a:t>
+              <a:t>Quick Data Stats</a:t>
             </a:r>
           </a:p>
         </p:txBody>
       </p:sp>
-      <p:sp>
-        <p:nvSpPr>
-          <p:cNvPr id="3" name="Content Placeholder 2">
+      <p:graphicFrame>
+        <p:nvGraphicFramePr>
+          <p:cNvPr id="13" name="Diagram 12">
             <a:extLst>
               <a:ext uri="{FF2B5EF4-FFF2-40B4-BE49-F238E27FC236}">
-                <a16:creationId xmlns:a16="http://schemas.microsoft.com/office/drawing/2014/main" id="{B4AB5789-DB02-45C6-A8ED-8C6F1B1DB8E7}"/>
+                <a16:creationId xmlns:a16="http://schemas.microsoft.com/office/drawing/2014/main" id="{787FB041-1B93-4807-92A2-F4783D98D53B}"/>
               </a:ext>
             </a:extLst>
           </p:cNvPr>
-          <p:cNvSpPr>
-            <a:spLocks noGrp="1"/>
-          </p:cNvSpPr>
+          <p:cNvGraphicFramePr/>
           <p:nvPr>
-            <p:ph idx="1"/>
+            <p:extLst>
+              <p:ext uri="{D42A27DB-BD31-4B8C-83A1-F6EECF244321}">
+                <p14:modId xmlns:p14="http://schemas.microsoft.com/office/powerpoint/2010/main" val="3350738886"/>
+              </p:ext>
+            </p:extLst>
           </p:nvPr>
-        </p:nvSpPr>
-        <p:spPr/>
-        <p:txBody>
-          <a:bodyPr/>
-          <a:lstStyle/>
-          <a:p>
-            <a:endParaRPr lang="en-US"/>
-          </a:p>
-        </p:txBody>
-      </p:sp>
+        </p:nvGraphicFramePr>
+        <p:xfrm>
+          <a:off x="410665" y="1515623"/>
+          <a:ext cx="9304834" cy="5066992"/>
+        </p:xfrm>
+        <a:graphic>
+          <a:graphicData uri="http://schemas.openxmlformats.org/drawingml/2006/diagram">
+            <dgm:relIds xmlns:dgm="http://schemas.openxmlformats.org/drawingml/2006/diagram" xmlns:r="http://schemas.openxmlformats.org/officeDocument/2006/relationships" r:dm="rId2" r:lo="rId3" r:qs="rId4" r:cs="rId5"/>
+          </a:graphicData>
+        </a:graphic>
+      </p:graphicFrame>
       <p:sp>
         <p:nvSpPr>
-          <p:cNvPr id="4" name="Text Placeholder 3">
+          <p:cNvPr id="15" name="TextBox 14">
             <a:extLst>
               <a:ext uri="{FF2B5EF4-FFF2-40B4-BE49-F238E27FC236}">
-                <a16:creationId xmlns:a16="http://schemas.microsoft.com/office/drawing/2014/main" id="{71D706D2-4641-4EB2-AE53-A80B3B3F8606}"/>
+                <a16:creationId xmlns:a16="http://schemas.microsoft.com/office/drawing/2014/main" id="{00CCC2E9-9A1F-460F-A6F8-3CEF5E0160CE}"/>
               </a:ext>
             </a:extLst>
           </p:cNvPr>
-          <p:cNvSpPr>
-            <a:spLocks noGrp="1"/>
-          </p:cNvSpPr>
-          <p:nvPr>
-            <p:ph type="body" idx="13"/>
-          </p:nvPr>
+          <p:cNvSpPr txBox="1"/>
+          <p:nvPr/>
         </p:nvSpPr>
-        <p:spPr/>
+        <p:spPr>
+          <a:xfrm>
+            <a:off x="9866810" y="1911531"/>
+            <a:ext cx="2127547" cy="784830"/>
+          </a:xfrm>
+          <a:prstGeom prst="rect">
+            <a:avLst/>
+          </a:prstGeom>
+          <a:noFill/>
+        </p:spPr>
         <p:txBody>
-          <a:bodyPr/>
+          <a:bodyPr wrap="square">
+            <a:spAutoFit/>
+          </a:bodyPr>
           <a:lstStyle/>
           <a:p>
             <a:r>
-              <a:rPr lang="en-US" dirty="0"/>
-              <a:t>“Limitless analytics service with unmatched time to insight.”</a:t>
+              <a:rPr lang="en-US" sz="900" dirty="0" err="1">
+                <a:latin typeface="Segoe UI" panose="020B0502040204020203" pitchFamily="34" charset="0"/>
+                <a:cs typeface="Segoe UI" panose="020B0502040204020203" pitchFamily="34" charset="0"/>
+              </a:rPr>
+              <a:t>Sudmant</a:t>
+            </a:r>
+            <a:r>
+              <a:rPr lang="en-US" sz="900" dirty="0">
+                <a:latin typeface="Segoe UI" panose="020B0502040204020203" pitchFamily="34" charset="0"/>
+                <a:cs typeface="Segoe UI" panose="020B0502040204020203" pitchFamily="34" charset="0"/>
+              </a:rPr>
+              <a:t>, P., Rausch, T., Gardner, E. </a:t>
+            </a:r>
+            <a:r>
+              <a:rPr lang="en-US" sz="900" i="1" dirty="0">
+                <a:latin typeface="Segoe UI" panose="020B0502040204020203" pitchFamily="34" charset="0"/>
+                <a:cs typeface="Segoe UI" panose="020B0502040204020203" pitchFamily="34" charset="0"/>
+              </a:rPr>
+              <a:t>et al.</a:t>
+            </a:r>
+            <a:r>
+              <a:rPr lang="en-US" sz="900" dirty="0">
+                <a:latin typeface="Segoe UI" panose="020B0502040204020203" pitchFamily="34" charset="0"/>
+                <a:cs typeface="Segoe UI" panose="020B0502040204020203" pitchFamily="34" charset="0"/>
+              </a:rPr>
+              <a:t> An integrated map of structural variation in 2,504 human genomes. </a:t>
+            </a:r>
+            <a:r>
+              <a:rPr lang="en-US" sz="900" i="1" dirty="0">
+                <a:latin typeface="Segoe UI" panose="020B0502040204020203" pitchFamily="34" charset="0"/>
+                <a:cs typeface="Segoe UI" panose="020B0502040204020203" pitchFamily="34" charset="0"/>
+              </a:rPr>
+              <a:t>Nature</a:t>
+            </a:r>
+            <a:r>
+              <a:rPr lang="en-US" sz="900" dirty="0">
+                <a:latin typeface="Segoe UI" panose="020B0502040204020203" pitchFamily="34" charset="0"/>
+                <a:cs typeface="Segoe UI" panose="020B0502040204020203" pitchFamily="34" charset="0"/>
+              </a:rPr>
+              <a:t> </a:t>
+            </a:r>
+            <a:r>
+              <a:rPr lang="en-US" sz="900" b="1" dirty="0">
+                <a:latin typeface="Segoe UI" panose="020B0502040204020203" pitchFamily="34" charset="0"/>
+                <a:cs typeface="Segoe UI" panose="020B0502040204020203" pitchFamily="34" charset="0"/>
+              </a:rPr>
+              <a:t>526, </a:t>
+            </a:r>
+            <a:r>
+              <a:rPr lang="en-US" sz="900" dirty="0">
+                <a:latin typeface="Segoe UI" panose="020B0502040204020203" pitchFamily="34" charset="0"/>
+                <a:cs typeface="Segoe UI" panose="020B0502040204020203" pitchFamily="34" charset="0"/>
+              </a:rPr>
+              <a:t>75–81 (2015). https://doi.org/10.1038/nature15394</a:t>
             </a:r>
           </a:p>
         </p:txBody>
       </p:sp>
-      <p:pic>
-        <p:nvPicPr>
-          <p:cNvPr id="7" name="Picture Placeholder 6">
-            <a:extLst>
-              <a:ext uri="{FF2B5EF4-FFF2-40B4-BE49-F238E27FC236}">
-                <a16:creationId xmlns:a16="http://schemas.microsoft.com/office/drawing/2014/main" id="{608067B8-87BF-4637-80BD-753441C95CBB}"/>
-              </a:ext>
-            </a:extLst>
-          </p:cNvPr>
-          <p:cNvPicPr>
-            <a:picLocks noGrp="1" noChangeAspect="1"/>
-          </p:cNvPicPr>
-          <p:nvPr>
-            <p:ph type="pic" sz="quarter" idx="14"/>
-          </p:nvPr>
-        </p:nvPicPr>
-        <p:blipFill rotWithShape="1">
-          <a:blip r:embed="rId2">
-            <a:extLst>
-              <a:ext uri="{96DAC541-7B7A-43D3-8B79-37D633B846F1}">
-                <asvg:svgBlip xmlns:asvg="http://schemas.microsoft.com/office/drawing/2016/SVG/main" r:embed="rId3"/>
-              </a:ext>
-            </a:extLst>
-          </a:blip>
-          <a:srcRect l="-11684" t="-9759" r="-11684" b="-9759"/>
-          <a:stretch/>
-        </p:blipFill>
-        <p:spPr>
-          <a:xfrm>
-            <a:off x="7166522" y="1866228"/>
-            <a:ext cx="4273020" cy="4141167"/>
-          </a:xfrm>
-        </p:spPr>
-      </p:pic>
     </p:spTree>
     <p:extLst>
       <p:ext uri="{BB962C8B-B14F-4D97-AF65-F5344CB8AC3E}">
-        <p14:creationId xmlns:p14="http://schemas.microsoft.com/office/powerpoint/2010/main" val="3475126820"/>
+        <p14:creationId xmlns:p14="http://schemas.microsoft.com/office/powerpoint/2010/main" val="650675843"/>
       </p:ext>
     </p:extLst>
   </p:cSld>
@@ -20513,6 +20692,305 @@
   <p:clrMapOvr>
     <a:masterClrMapping/>
   </p:clrMapOvr>
+  <p:timing>
+    <p:tnLst>
+      <p:par>
+        <p:cTn id="1" dur="indefinite" restart="never" nodeType="tmRoot">
+          <p:childTnLst>
+            <p:seq concurrent="1" nextAc="seek">
+              <p:cTn id="2" dur="indefinite" nodeType="mainSeq">
+                <p:childTnLst>
+                  <p:par>
+                    <p:cTn id="3" fill="hold">
+                      <p:stCondLst>
+                        <p:cond delay="indefinite"/>
+                      </p:stCondLst>
+                      <p:childTnLst>
+                        <p:par>
+                          <p:cTn id="4" fill="hold">
+                            <p:stCondLst>
+                              <p:cond delay="0"/>
+                            </p:stCondLst>
+                            <p:childTnLst>
+                              <p:par>
+                                <p:cTn id="5" presetID="10" presetClass="entr" presetSubtype="0" fill="hold" nodeType="clickEffect">
+                                  <p:stCondLst>
+                                    <p:cond delay="0"/>
+                                  </p:stCondLst>
+                                  <p:childTnLst>
+                                    <p:set>
+                                      <p:cBhvr>
+                                        <p:cTn id="6" dur="1" fill="hold">
+                                          <p:stCondLst>
+                                            <p:cond delay="0"/>
+                                          </p:stCondLst>
+                                        </p:cTn>
+                                        <p:tgtEl>
+                                          <p:spTgt spid="8"/>
+                                        </p:tgtEl>
+                                        <p:attrNameLst>
+                                          <p:attrName>style.visibility</p:attrName>
+                                        </p:attrNameLst>
+                                      </p:cBhvr>
+                                      <p:to>
+                                        <p:strVal val="visible"/>
+                                      </p:to>
+                                    </p:set>
+                                    <p:animEffect transition="in" filter="fade">
+                                      <p:cBhvr>
+                                        <p:cTn id="7" dur="500"/>
+                                        <p:tgtEl>
+                                          <p:spTgt spid="8"/>
+                                        </p:tgtEl>
+                                      </p:cBhvr>
+                                    </p:animEffect>
+                                  </p:childTnLst>
+                                </p:cTn>
+                              </p:par>
+                              <p:par>
+                                <p:cTn id="8" presetID="10" presetClass="entr" presetSubtype="0" fill="hold" grpId="0" nodeType="withEffect">
+                                  <p:stCondLst>
+                                    <p:cond delay="0"/>
+                                  </p:stCondLst>
+                                  <p:childTnLst>
+                                    <p:set>
+                                      <p:cBhvr>
+                                        <p:cTn id="9" dur="1" fill="hold">
+                                          <p:stCondLst>
+                                            <p:cond delay="0"/>
+                                          </p:stCondLst>
+                                        </p:cTn>
+                                        <p:tgtEl>
+                                          <p:spTgt spid="4"/>
+                                        </p:tgtEl>
+                                        <p:attrNameLst>
+                                          <p:attrName>style.visibility</p:attrName>
+                                        </p:attrNameLst>
+                                      </p:cBhvr>
+                                      <p:to>
+                                        <p:strVal val="visible"/>
+                                      </p:to>
+                                    </p:set>
+                                    <p:animEffect transition="in" filter="fade">
+                                      <p:cBhvr>
+                                        <p:cTn id="10" dur="500"/>
+                                        <p:tgtEl>
+                                          <p:spTgt spid="4"/>
+                                        </p:tgtEl>
+                                      </p:cBhvr>
+                                    </p:animEffect>
+                                  </p:childTnLst>
+                                </p:cTn>
+                              </p:par>
+                            </p:childTnLst>
+                          </p:cTn>
+                        </p:par>
+                      </p:childTnLst>
+                    </p:cTn>
+                  </p:par>
+                  <p:par>
+                    <p:cTn id="11" fill="hold">
+                      <p:stCondLst>
+                        <p:cond delay="indefinite"/>
+                      </p:stCondLst>
+                      <p:childTnLst>
+                        <p:par>
+                          <p:cTn id="12" fill="hold">
+                            <p:stCondLst>
+                              <p:cond delay="0"/>
+                            </p:stCondLst>
+                            <p:childTnLst>
+                              <p:par>
+                                <p:cTn id="13" presetID="10" presetClass="entr" presetSubtype="0" fill="hold" nodeType="clickEffect">
+                                  <p:stCondLst>
+                                    <p:cond delay="0"/>
+                                  </p:stCondLst>
+                                  <p:childTnLst>
+                                    <p:set>
+                                      <p:cBhvr>
+                                        <p:cTn id="14" dur="1" fill="hold">
+                                          <p:stCondLst>
+                                            <p:cond delay="0"/>
+                                          </p:stCondLst>
+                                        </p:cTn>
+                                        <p:tgtEl>
+                                          <p:spTgt spid="9"/>
+                                        </p:tgtEl>
+                                        <p:attrNameLst>
+                                          <p:attrName>style.visibility</p:attrName>
+                                        </p:attrNameLst>
+                                      </p:cBhvr>
+                                      <p:to>
+                                        <p:strVal val="visible"/>
+                                      </p:to>
+                                    </p:set>
+                                    <p:animEffect transition="in" filter="fade">
+                                      <p:cBhvr>
+                                        <p:cTn id="15" dur="500"/>
+                                        <p:tgtEl>
+                                          <p:spTgt spid="9"/>
+                                        </p:tgtEl>
+                                      </p:cBhvr>
+                                    </p:animEffect>
+                                  </p:childTnLst>
+                                </p:cTn>
+                              </p:par>
+                              <p:par>
+                                <p:cTn id="16" presetID="10" presetClass="entr" presetSubtype="0" fill="hold" grpId="0" nodeType="withEffect">
+                                  <p:stCondLst>
+                                    <p:cond delay="0"/>
+                                  </p:stCondLst>
+                                  <p:childTnLst>
+                                    <p:set>
+                                      <p:cBhvr>
+                                        <p:cTn id="17" dur="1" fill="hold">
+                                          <p:stCondLst>
+                                            <p:cond delay="0"/>
+                                          </p:stCondLst>
+                                        </p:cTn>
+                                        <p:tgtEl>
+                                          <p:spTgt spid="5"/>
+                                        </p:tgtEl>
+                                        <p:attrNameLst>
+                                          <p:attrName>style.visibility</p:attrName>
+                                        </p:attrNameLst>
+                                      </p:cBhvr>
+                                      <p:to>
+                                        <p:strVal val="visible"/>
+                                      </p:to>
+                                    </p:set>
+                                    <p:animEffect transition="in" filter="fade">
+                                      <p:cBhvr>
+                                        <p:cTn id="18" dur="500"/>
+                                        <p:tgtEl>
+                                          <p:spTgt spid="5"/>
+                                        </p:tgtEl>
+                                      </p:cBhvr>
+                                    </p:animEffect>
+                                  </p:childTnLst>
+                                </p:cTn>
+                              </p:par>
+                            </p:childTnLst>
+                          </p:cTn>
+                        </p:par>
+                      </p:childTnLst>
+                    </p:cTn>
+                  </p:par>
+                  <p:par>
+                    <p:cTn id="19" fill="hold">
+                      <p:stCondLst>
+                        <p:cond delay="indefinite"/>
+                      </p:stCondLst>
+                      <p:childTnLst>
+                        <p:par>
+                          <p:cTn id="20" fill="hold">
+                            <p:stCondLst>
+                              <p:cond delay="0"/>
+                            </p:stCondLst>
+                            <p:childTnLst>
+                              <p:par>
+                                <p:cTn id="21" presetID="10" presetClass="entr" presetSubtype="0" fill="hold" nodeType="clickEffect">
+                                  <p:stCondLst>
+                                    <p:cond delay="0"/>
+                                  </p:stCondLst>
+                                  <p:childTnLst>
+                                    <p:set>
+                                      <p:cBhvr>
+                                        <p:cTn id="22" dur="1" fill="hold">
+                                          <p:stCondLst>
+                                            <p:cond delay="0"/>
+                                          </p:stCondLst>
+                                        </p:cTn>
+                                        <p:tgtEl>
+                                          <p:spTgt spid="12"/>
+                                        </p:tgtEl>
+                                        <p:attrNameLst>
+                                          <p:attrName>style.visibility</p:attrName>
+                                        </p:attrNameLst>
+                                      </p:cBhvr>
+                                      <p:to>
+                                        <p:strVal val="visible"/>
+                                      </p:to>
+                                    </p:set>
+                                    <p:animEffect transition="in" filter="fade">
+                                      <p:cBhvr>
+                                        <p:cTn id="23" dur="500"/>
+                                        <p:tgtEl>
+                                          <p:spTgt spid="12"/>
+                                        </p:tgtEl>
+                                      </p:cBhvr>
+                                    </p:animEffect>
+                                  </p:childTnLst>
+                                </p:cTn>
+                              </p:par>
+                              <p:par>
+                                <p:cTn id="24" presetID="10" presetClass="entr" presetSubtype="0" fill="hold" grpId="0" nodeType="withEffect">
+                                  <p:stCondLst>
+                                    <p:cond delay="0"/>
+                                  </p:stCondLst>
+                                  <p:childTnLst>
+                                    <p:set>
+                                      <p:cBhvr>
+                                        <p:cTn id="25" dur="1" fill="hold">
+                                          <p:stCondLst>
+                                            <p:cond delay="0"/>
+                                          </p:stCondLst>
+                                        </p:cTn>
+                                        <p:tgtEl>
+                                          <p:spTgt spid="6"/>
+                                        </p:tgtEl>
+                                        <p:attrNameLst>
+                                          <p:attrName>style.visibility</p:attrName>
+                                        </p:attrNameLst>
+                                      </p:cBhvr>
+                                      <p:to>
+                                        <p:strVal val="visible"/>
+                                      </p:to>
+                                    </p:set>
+                                    <p:animEffect transition="in" filter="fade">
+                                      <p:cBhvr>
+                                        <p:cTn id="26" dur="500"/>
+                                        <p:tgtEl>
+                                          <p:spTgt spid="6"/>
+                                        </p:tgtEl>
+                                      </p:cBhvr>
+                                    </p:animEffect>
+                                  </p:childTnLst>
+                                </p:cTn>
+                              </p:par>
+                            </p:childTnLst>
+                          </p:cTn>
+                        </p:par>
+                      </p:childTnLst>
+                    </p:cTn>
+                  </p:par>
+                </p:childTnLst>
+              </p:cTn>
+              <p:prevCondLst>
+                <p:cond evt="onPrev" delay="0">
+                  <p:tgtEl>
+                    <p:sldTgt/>
+                  </p:tgtEl>
+                </p:cond>
+              </p:prevCondLst>
+              <p:nextCondLst>
+                <p:cond evt="onNext" delay="0">
+                  <p:tgtEl>
+                    <p:sldTgt/>
+                  </p:tgtEl>
+                </p:cond>
+              </p:nextCondLst>
+            </p:seq>
+          </p:childTnLst>
+        </p:cTn>
+      </p:par>
+    </p:tnLst>
+    <p:bldLst>
+      <p:bldP spid="4" grpId="0" animBg="1"/>
+      <p:bldP spid="5" grpId="0" animBg="1"/>
+      <p:bldP spid="6" grpId="0" animBg="1"/>
+    </p:bldLst>
+  </p:timing>
 </p:sld>
 </file>
 
@@ -20885,7 +21363,7 @@
               <a:rPr lang="en-US" dirty="0">
                 <a:latin typeface="Consolas" panose="020B0609020204030204" pitchFamily="49" charset="0"/>
               </a:rPr>
-              <a:t>              .</a:t>
+              <a:t>	       .</a:t>
             </a:r>
             <a:r>
               <a:rPr lang="en-US" dirty="0" err="1">
@@ -21266,6 +21744,213 @@
   <p:clrMapOvr>
     <a:masterClrMapping/>
   </p:clrMapOvr>
+  <p:timing>
+    <p:tnLst>
+      <p:par>
+        <p:cTn id="1" dur="indefinite" restart="never" nodeType="tmRoot">
+          <p:childTnLst>
+            <p:seq concurrent="1" nextAc="seek">
+              <p:cTn id="2" dur="indefinite" nodeType="mainSeq">
+                <p:childTnLst>
+                  <p:par>
+                    <p:cTn id="3" fill="hold">
+                      <p:stCondLst>
+                        <p:cond delay="indefinite"/>
+                      </p:stCondLst>
+                      <p:childTnLst>
+                        <p:par>
+                          <p:cTn id="4" fill="hold">
+                            <p:stCondLst>
+                              <p:cond delay="0"/>
+                            </p:stCondLst>
+                            <p:childTnLst>
+                              <p:par>
+                                <p:cTn id="5" presetID="10" presetClass="entr" presetSubtype="0" fill="hold" nodeType="clickEffect">
+                                  <p:stCondLst>
+                                    <p:cond delay="0"/>
+                                  </p:stCondLst>
+                                  <p:childTnLst>
+                                    <p:set>
+                                      <p:cBhvr>
+                                        <p:cTn id="6" dur="1" fill="hold">
+                                          <p:stCondLst>
+                                            <p:cond delay="0"/>
+                                          </p:stCondLst>
+                                        </p:cTn>
+                                        <p:tgtEl>
+                                          <p:spTgt spid="4">
+                                            <p:txEl>
+                                              <p:pRg st="4" end="4"/>
+                                            </p:txEl>
+                                          </p:spTgt>
+                                        </p:tgtEl>
+                                        <p:attrNameLst>
+                                          <p:attrName>style.visibility</p:attrName>
+                                        </p:attrNameLst>
+                                      </p:cBhvr>
+                                      <p:to>
+                                        <p:strVal val="visible"/>
+                                      </p:to>
+                                    </p:set>
+                                    <p:animEffect transition="in" filter="fade">
+                                      <p:cBhvr>
+                                        <p:cTn id="7" dur="500"/>
+                                        <p:tgtEl>
+                                          <p:spTgt spid="4">
+                                            <p:txEl>
+                                              <p:pRg st="4" end="4"/>
+                                            </p:txEl>
+                                          </p:spTgt>
+                                        </p:tgtEl>
+                                      </p:cBhvr>
+                                    </p:animEffect>
+                                  </p:childTnLst>
+                                </p:cTn>
+                              </p:par>
+                              <p:par>
+                                <p:cTn id="8" presetID="10" presetClass="entr" presetSubtype="0" fill="hold" nodeType="withEffect">
+                                  <p:stCondLst>
+                                    <p:cond delay="0"/>
+                                  </p:stCondLst>
+                                  <p:childTnLst>
+                                    <p:set>
+                                      <p:cBhvr>
+                                        <p:cTn id="9" dur="1" fill="hold">
+                                          <p:stCondLst>
+                                            <p:cond delay="0"/>
+                                          </p:stCondLst>
+                                        </p:cTn>
+                                        <p:tgtEl>
+                                          <p:spTgt spid="4">
+                                            <p:txEl>
+                                              <p:pRg st="5" end="5"/>
+                                            </p:txEl>
+                                          </p:spTgt>
+                                        </p:tgtEl>
+                                        <p:attrNameLst>
+                                          <p:attrName>style.visibility</p:attrName>
+                                        </p:attrNameLst>
+                                      </p:cBhvr>
+                                      <p:to>
+                                        <p:strVal val="visible"/>
+                                      </p:to>
+                                    </p:set>
+                                    <p:animEffect transition="in" filter="fade">
+                                      <p:cBhvr>
+                                        <p:cTn id="10" dur="500"/>
+                                        <p:tgtEl>
+                                          <p:spTgt spid="4">
+                                            <p:txEl>
+                                              <p:pRg st="5" end="5"/>
+                                            </p:txEl>
+                                          </p:spTgt>
+                                        </p:tgtEl>
+                                      </p:cBhvr>
+                                    </p:animEffect>
+                                  </p:childTnLst>
+                                </p:cTn>
+                              </p:par>
+                              <p:par>
+                                <p:cTn id="11" presetID="10" presetClass="entr" presetSubtype="0" fill="hold" grpId="0" nodeType="withEffect">
+                                  <p:stCondLst>
+                                    <p:cond delay="0"/>
+                                  </p:stCondLst>
+                                  <p:childTnLst>
+                                    <p:set>
+                                      <p:cBhvr>
+                                        <p:cTn id="12" dur="1" fill="hold">
+                                          <p:stCondLst>
+                                            <p:cond delay="0"/>
+                                          </p:stCondLst>
+                                        </p:cTn>
+                                        <p:tgtEl>
+                                          <p:spTgt spid="11"/>
+                                        </p:tgtEl>
+                                        <p:attrNameLst>
+                                          <p:attrName>style.visibility</p:attrName>
+                                        </p:attrNameLst>
+                                      </p:cBhvr>
+                                      <p:to>
+                                        <p:strVal val="visible"/>
+                                      </p:to>
+                                    </p:set>
+                                    <p:animEffect transition="in" filter="fade">
+                                      <p:cBhvr>
+                                        <p:cTn id="13" dur="500"/>
+                                        <p:tgtEl>
+                                          <p:spTgt spid="11"/>
+                                        </p:tgtEl>
+                                      </p:cBhvr>
+                                    </p:animEffect>
+                                  </p:childTnLst>
+                                </p:cTn>
+                              </p:par>
+                              <p:par>
+                                <p:cTn id="14" presetID="10" presetClass="entr" presetSubtype="0" fill="hold" nodeType="withEffect">
+                                  <p:stCondLst>
+                                    <p:cond delay="0"/>
+                                  </p:stCondLst>
+                                  <p:childTnLst>
+                                    <p:set>
+                                      <p:cBhvr>
+                                        <p:cTn id="15" dur="1" fill="hold">
+                                          <p:stCondLst>
+                                            <p:cond delay="0"/>
+                                          </p:stCondLst>
+                                        </p:cTn>
+                                        <p:tgtEl>
+                                          <p:spTgt spid="10"/>
+                                        </p:tgtEl>
+                                        <p:attrNameLst>
+                                          <p:attrName>style.visibility</p:attrName>
+                                        </p:attrNameLst>
+                                      </p:cBhvr>
+                                      <p:to>
+                                        <p:strVal val="visible"/>
+                                      </p:to>
+                                    </p:set>
+                                    <p:animEffect transition="in" filter="fade">
+                                      <p:cBhvr>
+                                        <p:cTn id="16" dur="500"/>
+                                        <p:tgtEl>
+                                          <p:spTgt spid="10"/>
+                                        </p:tgtEl>
+                                      </p:cBhvr>
+                                    </p:animEffect>
+                                  </p:childTnLst>
+                                </p:cTn>
+                              </p:par>
+                            </p:childTnLst>
+                          </p:cTn>
+                        </p:par>
+                      </p:childTnLst>
+                    </p:cTn>
+                  </p:par>
+                </p:childTnLst>
+              </p:cTn>
+              <p:prevCondLst>
+                <p:cond evt="onPrev" delay="0">
+                  <p:tgtEl>
+                    <p:sldTgt/>
+                  </p:tgtEl>
+                </p:cond>
+              </p:prevCondLst>
+              <p:nextCondLst>
+                <p:cond evt="onNext" delay="0">
+                  <p:tgtEl>
+                    <p:sldTgt/>
+                  </p:tgtEl>
+                </p:cond>
+              </p:nextCondLst>
+            </p:seq>
+          </p:childTnLst>
+        </p:cTn>
+      </p:par>
+    </p:tnLst>
+    <p:bldLst>
+      <p:bldP spid="11" grpId="0"/>
+    </p:bldLst>
+  </p:timing>
 </p:sld>
 </file>
 

</xml_diff>

<commit_message>
Add VCF conversion code
</commit_message>
<xml_diff>
--- a/Query Millions of WGS Variants in Minutes with Azure Synapse.pptx
+++ b/Query Millions of WGS Variants in Minutes with Azure Synapse.pptx
@@ -23226,8 +23226,8 @@
         </p:nvSpPr>
         <p:spPr>
           <a:xfrm>
-            <a:off x="754146" y="3583597"/>
-            <a:ext cx="12594208" cy="8619498"/>
+            <a:off x="754145" y="3583597"/>
+            <a:ext cx="14632195" cy="8619498"/>
           </a:xfrm>
         </p:spPr>
         <p:txBody>
@@ -23236,7 +23236,7 @@
           <a:p>
             <a:r>
               <a:rPr lang="en-US" dirty="0"/>
-              <a:t>Scalable analytics platform that includes Azure SQL Data Warehouse, Data Lake exploration, Apache Spark, integration with Power BI, and more.</a:t>
+              <a:t>Scalable analytics platform that includes a SQL engine (formerly Azure SQL Data Warehouse), Data Lake exploration, Apache Spark, integration with Power BI, and more.</a:t>
             </a:r>
           </a:p>
         </p:txBody>

</xml_diff>